<commit_message>
make the front page pretty
</commit_message>
<xml_diff>
--- a/Presentations/Kevin_Wecht_Week3Demo.pptx
+++ b/Presentations/Kevin_Wecht_Week3Demo.pptx
@@ -3865,11 +3865,7 @@
           <a:p>
             <a:r>
               <a:rPr lang="en-US" dirty="0" smtClean="0"/>
-              <a:t>Yel</a:t>
-            </a:r>
-            <a:r>
-              <a:rPr lang="en-US" dirty="0" smtClean="0"/>
-              <a:t>p Academic Dataset (Phoenix, AZ)</a:t>
+              <a:t>Yelp Academic Dataset (Phoenix, AZ)</a:t>
             </a:r>
           </a:p>
           <a:p>
@@ -3879,21 +3875,8 @@
             </a:pPr>
             <a:r>
               <a:rPr lang="en-US" dirty="0" smtClean="0"/>
-              <a:t> </a:t>
-            </a:r>
-            <a:r>
-              <a:rPr lang="en-US" dirty="0" smtClean="0"/>
-              <a:t>800 </a:t>
-            </a:r>
-            <a:r>
-              <a:rPr lang="en-US" dirty="0" smtClean="0"/>
-              <a:t>Mexican </a:t>
-            </a:r>
-            <a:r>
-              <a:rPr lang="en-US" dirty="0" smtClean="0"/>
-              <a:t>restaurants</a:t>
-            </a:r>
-            <a:endParaRPr lang="en-US" dirty="0" smtClean="0"/>
+              <a:t> 800 Mexican restaurants</a:t>
+            </a:r>
           </a:p>
           <a:p>
             <a:pPr lvl="1">
@@ -3902,11 +3885,7 @@
             </a:pPr>
             <a:r>
               <a:rPr lang="en-US" dirty="0" smtClean="0"/>
-              <a:t> </a:t>
-            </a:r>
-            <a:r>
-              <a:rPr lang="en-US" dirty="0" smtClean="0"/>
-              <a:t>40,000 reviews</a:t>
+              <a:t> 40,000 reviews</a:t>
             </a:r>
           </a:p>
           <a:p>
@@ -3916,17 +3895,8 @@
             </a:pPr>
             <a:r>
               <a:rPr lang="en-US" dirty="0" smtClean="0"/>
-              <a:t> </a:t>
-            </a:r>
-            <a:r>
-              <a:rPr lang="en-US" dirty="0" smtClean="0"/>
-              <a:t>300,000</a:t>
-            </a:r>
-            <a:r>
-              <a:rPr lang="en-US" dirty="0" smtClean="0"/>
-              <a:t> sentences</a:t>
-            </a:r>
-            <a:endParaRPr lang="en-US" dirty="0" smtClean="0"/>
+              <a:t> 300,000 sentences</a:t>
+            </a:r>
           </a:p>
         </p:txBody>
       </p:sp>
@@ -4157,11 +4127,7 @@
             <a:pPr algn="ctr"/>
             <a:r>
               <a:rPr lang="en-US" sz="2400" dirty="0" smtClean="0"/>
-              <a:t>5</a:t>
-            </a:r>
-            <a:r>
-              <a:rPr lang="en-US" sz="2400" dirty="0" smtClean="0"/>
-              <a:t>-Star Words</a:t>
+              <a:t>5-Star Words</a:t>
             </a:r>
             <a:endParaRPr lang="en-US" sz="2400" dirty="0"/>
           </a:p>
@@ -4190,17 +4156,12 @@
           <a:p>
             <a:r>
               <a:rPr lang="en-US" sz="2800" u="sng" dirty="0" smtClean="0"/>
-              <a:t>The</a:t>
-            </a:r>
-            <a:r>
-              <a:rPr lang="en-US" sz="2800" u="sng" dirty="0" smtClean="0"/>
-              <a:t> Idea</a:t>
+              <a:t>The Idea</a:t>
             </a:r>
             <a:r>
               <a:rPr lang="en-US" sz="2800" dirty="0" smtClean="0"/>
               <a:t>:</a:t>
             </a:r>
-            <a:endParaRPr lang="en-US" sz="2800" dirty="0" smtClean="0"/>
           </a:p>
         </p:txBody>
       </p:sp>
@@ -4306,6 +4267,54 @@
           </a:p>
         </p:txBody>
       </p:sp>
+      <p:pic>
+        <p:nvPicPr>
+          <p:cNvPr id="14" name="Picture 13"/>
+          <p:cNvPicPr>
+            <a:picLocks noChangeAspect="1"/>
+          </p:cNvPicPr>
+          <p:nvPr/>
+        </p:nvPicPr>
+        <p:blipFill>
+          <a:blip r:embed="rId4"/>
+          <a:stretch>
+            <a:fillRect/>
+          </a:stretch>
+        </p:blipFill>
+        <p:spPr>
+          <a:xfrm>
+            <a:off x="1409626" y="4755786"/>
+            <a:ext cx="1701800" cy="393700"/>
+          </a:xfrm>
+          <a:prstGeom prst="rect">
+            <a:avLst/>
+          </a:prstGeom>
+        </p:spPr>
+      </p:pic>
+      <p:pic>
+        <p:nvPicPr>
+          <p:cNvPr id="15" name="Picture 14"/>
+          <p:cNvPicPr>
+            <a:picLocks noChangeAspect="1"/>
+          </p:cNvPicPr>
+          <p:nvPr/>
+        </p:nvPicPr>
+        <p:blipFill>
+          <a:blip r:embed="rId5"/>
+          <a:stretch>
+            <a:fillRect/>
+          </a:stretch>
+        </p:blipFill>
+        <p:spPr>
+          <a:xfrm>
+            <a:off x="1422326" y="4261343"/>
+            <a:ext cx="1689100" cy="381000"/>
+          </a:xfrm>
+          <a:prstGeom prst="rect">
+            <a:avLst/>
+          </a:prstGeom>
+        </p:spPr>
+      </p:pic>
     </p:spTree>
   </p:cSld>
   <p:clrMapOvr>
@@ -5551,31 +5560,6 @@
           </a:p>
         </p:txBody>
       </p:sp>
-      <p:pic>
-        <p:nvPicPr>
-          <p:cNvPr id="25" name="Picture 24" descr="FFscore_distribution_all.png"/>
-          <p:cNvPicPr>
-            <a:picLocks noChangeAspect="1"/>
-          </p:cNvPicPr>
-          <p:nvPr/>
-        </p:nvPicPr>
-        <p:blipFill>
-          <a:blip r:embed="rId3"/>
-          <a:srcRect l="11772" t="9321" r="9414" b="11806"/>
-          <a:stretch>
-            <a:fillRect/>
-          </a:stretch>
-        </p:blipFill>
-        <p:spPr>
-          <a:xfrm>
-            <a:off x="2152952" y="1788251"/>
-            <a:ext cx="5261429" cy="3493685"/>
-          </a:xfrm>
-          <a:prstGeom prst="rect">
-            <a:avLst/>
-          </a:prstGeom>
-        </p:spPr>
-      </p:pic>
       <p:sp>
         <p:nvSpPr>
           <p:cNvPr id="21" name="TextBox 20"/>
@@ -5640,6 +5624,30 @@
           </a:p>
         </p:txBody>
       </p:sp>
+      <p:pic>
+        <p:nvPicPr>
+          <p:cNvPr id="22" name="Picture 21"/>
+          <p:cNvPicPr>
+            <a:picLocks noChangeAspect="1"/>
+          </p:cNvPicPr>
+          <p:nvPr/>
+        </p:nvPicPr>
+        <p:blipFill>
+          <a:blip r:embed="rId3"/>
+          <a:stretch>
+            <a:fillRect/>
+          </a:stretch>
+        </p:blipFill>
+        <p:spPr>
+          <a:xfrm>
+            <a:off x="2165047" y="1800345"/>
+            <a:ext cx="5273524" cy="3541457"/>
+          </a:xfrm>
+          <a:prstGeom prst="rect">
+            <a:avLst/>
+          </a:prstGeom>
+        </p:spPr>
+      </p:pic>
     </p:spTree>
   </p:cSld>
   <p:clrMapOvr>
@@ -5874,16 +5882,40 @@
           </a:p>
         </p:txBody>
       </p:sp>
-      <p:sp>
-        <p:nvSpPr>
-          <p:cNvPr id="22" name="TextBox 21"/>
+      <p:pic>
+        <p:nvPicPr>
+          <p:cNvPr id="5" name="Picture 4"/>
+          <p:cNvPicPr>
+            <a:picLocks noChangeAspect="1"/>
+          </p:cNvPicPr>
+          <p:nvPr/>
+        </p:nvPicPr>
+        <p:blipFill>
+          <a:blip r:embed="rId2"/>
+          <a:stretch>
+            <a:fillRect/>
+          </a:stretch>
+        </p:blipFill>
+        <p:spPr>
+          <a:xfrm>
+            <a:off x="262769" y="1330476"/>
+            <a:ext cx="6489700" cy="3302000"/>
+          </a:xfrm>
+          <a:prstGeom prst="rect">
+            <a:avLst/>
+          </a:prstGeom>
+        </p:spPr>
+      </p:pic>
+      <p:sp>
+        <p:nvSpPr>
+          <p:cNvPr id="6" name="TextBox 5"/>
           <p:cNvSpPr txBox="1"/>
           <p:nvPr/>
         </p:nvSpPr>
         <p:spPr>
           <a:xfrm>
-            <a:off x="3398762" y="2975429"/>
-            <a:ext cx="2781905" cy="1477328"/>
+            <a:off x="556381" y="4632476"/>
+            <a:ext cx="6519333" cy="1200329"/>
           </a:xfrm>
           <a:prstGeom prst="rect">
             <a:avLst/>
@@ -5898,7 +5930,25 @@
           <a:p>
             <a:r>
               <a:rPr lang="en-US" dirty="0" smtClean="0"/>
-              <a:t>Plot of evaluation for a single restaurant. Hopefully a well-known chain or something that comes up in the demo search.</a:t>
+              <a:t>One review on the restaurant’s Yelp page:</a:t>
+            </a:r>
+          </a:p>
+          <a:p>
+            <a:r>
+              <a:rPr lang="en-US" dirty="0" smtClean="0"/>
+              <a:t>      “It is super cute and I love the décor…</a:t>
+            </a:r>
+          </a:p>
+          <a:p>
+            <a:r>
+              <a:rPr lang="en-US" dirty="0" smtClean="0"/>
+              <a:t>      I have to say that the food is inconsistent…</a:t>
+            </a:r>
+          </a:p>
+          <a:p>
+            <a:r>
+              <a:rPr lang="en-US" dirty="0" smtClean="0"/>
+              <a:t>      I am still thinking about how good the veggie burrito is…”</a:t>
             </a:r>
             <a:endParaRPr lang="en-US" dirty="0"/>
           </a:p>

</xml_diff>